<commit_message>
ajusted selling price etc
</commit_message>
<xml_diff>
--- a/Präsentation/Präsentation.pptx
+++ b/Präsentation/Präsentation.pptx
@@ -4416,7 +4416,7 @@
           <a:p>
             <a:fld id="{5C20507F-F644-498B-8FD8-DF1C414025EC}" type="datetimeFigureOut">
               <a:rPr lang="de-DE" smtClean="0"/>
-              <a:t>03.11.2019</a:t>
+              <a:t>04.11.2019</a:t>
             </a:fld>
             <a:endParaRPr lang="de-DE"/>
           </a:p>
@@ -4929,7 +4929,7 @@
             </a:pPr>
             <a:r>
               <a:rPr lang="de-DE" dirty="0"/>
-              <a:t>-   Endprodukt wird für etwa 0.87€/l  verkauft</a:t>
+              <a:t>-   Endprodukt wird für etwa 0.87€/500ml  verkauft</a:t>
             </a:r>
           </a:p>
           <a:p>
@@ -4949,13 +4949,8 @@
             </a:pPr>
             <a:r>
               <a:rPr lang="de-DE" dirty="0"/>
-              <a:t>Produktionskosten von 0.675€</a:t>
-            </a:r>
-            <a:r>
-              <a:rPr lang="de-DE"/>
-              <a:t>/l</a:t>
-            </a:r>
-            <a:endParaRPr lang="de-DE" dirty="0"/>
+              <a:t>Produktionskosten von 0.675€/500ml</a:t>
+            </a:r>
           </a:p>
         </p:txBody>
       </p:sp>
@@ -5221,7 +5216,7 @@
           <a:p>
             <a:fld id="{E20E4F3F-845D-4F9B-8146-D1519830B904}" type="datetime1">
               <a:rPr lang="de-DE" smtClean="0"/>
-              <a:t>03.11.2019</a:t>
+              <a:t>04.11.2019</a:t>
             </a:fld>
             <a:endParaRPr lang="de-DE"/>
           </a:p>
@@ -5444,7 +5439,7 @@
           <a:p>
             <a:fld id="{D6AF7F36-D3CF-4CB1-A198-5DBF5AE98F98}" type="datetime1">
               <a:rPr lang="de-DE" smtClean="0"/>
-              <a:t>03.11.2019</a:t>
+              <a:t>04.11.2019</a:t>
             </a:fld>
             <a:endParaRPr lang="de-DE"/>
           </a:p>
@@ -5715,7 +5710,7 @@
           <a:p>
             <a:fld id="{D034C2E4-6ADB-4C4E-B6E6-AED16E990A6B}" type="datetime1">
               <a:rPr lang="de-DE" smtClean="0"/>
-              <a:t>03.11.2019</a:t>
+              <a:t>04.11.2019</a:t>
             </a:fld>
             <a:endParaRPr lang="de-DE"/>
           </a:p>
@@ -5900,7 +5895,7 @@
           <a:p>
             <a:fld id="{8CAE0EDF-60BD-4F7C-BA0E-CEC3494323E3}" type="datetime1">
               <a:rPr lang="de-DE" smtClean="0"/>
-              <a:t>03.11.2019</a:t>
+              <a:t>04.11.2019</a:t>
             </a:fld>
             <a:endParaRPr lang="de-DE"/>
           </a:p>
@@ -6258,7 +6253,7 @@
           <a:p>
             <a:fld id="{65E87D71-8681-4979-A5E3-070DCB1B5789}" type="datetime1">
               <a:rPr lang="de-DE" smtClean="0"/>
-              <a:t>03.11.2019</a:t>
+              <a:t>04.11.2019</a:t>
             </a:fld>
             <a:endParaRPr lang="de-DE"/>
           </a:p>
@@ -6548,7 +6543,7 @@
           <a:p>
             <a:fld id="{FA6C8370-3AD9-4037-968C-483DB437FCFE}" type="datetime1">
               <a:rPr lang="de-DE" smtClean="0"/>
-              <a:t>03.11.2019</a:t>
+              <a:t>04.11.2019</a:t>
             </a:fld>
             <a:endParaRPr lang="de-DE"/>
           </a:p>
@@ -6942,7 +6937,7 @@
           <a:p>
             <a:fld id="{A9D059DF-F17F-4E6E-B5FE-C4568F9CDDED}" type="datetime1">
               <a:rPr lang="de-DE" smtClean="0"/>
-              <a:t>03.11.2019</a:t>
+              <a:t>04.11.2019</a:t>
             </a:fld>
             <a:endParaRPr lang="de-DE"/>
           </a:p>
@@ -7075,7 +7070,7 @@
           <a:p>
             <a:fld id="{33C65DDB-696D-4624-8A56-11F23A4BD75D}" type="datetime1">
               <a:rPr lang="de-DE" smtClean="0"/>
-              <a:t>03.11.2019</a:t>
+              <a:t>04.11.2019</a:t>
             </a:fld>
             <a:endParaRPr lang="de-DE"/>
           </a:p>
@@ -7261,7 +7256,7 @@
           <a:p>
             <a:fld id="{3755A3D4-8D6E-4B3D-815E-622AEB78E06F}" type="datetime1">
               <a:rPr lang="de-DE" smtClean="0"/>
-              <a:t>03.11.2019</a:t>
+              <a:t>04.11.2019</a:t>
             </a:fld>
             <a:endParaRPr lang="de-DE"/>
           </a:p>
@@ -7630,7 +7625,7 @@
           <a:p>
             <a:fld id="{6B6C2961-9553-4839-AF75-01B62C904A1D}" type="datetime1">
               <a:rPr lang="de-DE" smtClean="0"/>
-              <a:t>03.11.2019</a:t>
+              <a:t>04.11.2019</a:t>
             </a:fld>
             <a:endParaRPr lang="de-DE"/>
           </a:p>
@@ -8022,7 +8017,7 @@
           <a:p>
             <a:fld id="{FA987991-0E6C-4CA2-9EA8-4339CDBF957C}" type="datetime1">
               <a:rPr lang="de-DE" smtClean="0"/>
-              <a:t>03.11.2019</a:t>
+              <a:t>04.11.2019</a:t>
             </a:fld>
             <a:endParaRPr lang="de-DE"/>
           </a:p>
@@ -8324,7 +8319,7 @@
           <a:p>
             <a:fld id="{D143D594-0D86-4019-A654-65D000944FED}" type="datetime1">
               <a:rPr lang="de-DE" smtClean="0"/>
-              <a:t>03.11.2019</a:t>
+              <a:t>04.11.2019</a:t>
             </a:fld>
             <a:endParaRPr lang="de-DE"/>
           </a:p>
@@ -10579,14 +10574,14 @@
             </a:br>
             <a:r>
               <a:rPr lang="de-DE" dirty="0"/>
-              <a:t>(1 – 0.10) * 10 000l * 0.0675 €/l = 607.5€ </a:t>
+              <a:t>(1 – 0.10) * 10 000l * 0.0675 €/500ml = 607.5€ /pro 5 000l</a:t>
             </a:r>
             <a:br>
               <a:rPr lang="de-DE" dirty="0"/>
             </a:br>
             <a:r>
               <a:rPr lang="de-DE" dirty="0"/>
-              <a:t>(1 – 0.01) * 10 000l * 0.0675 €/l = 668.25€  =&gt; 60.75€ mehr Gewinn pro 10 000l</a:t>
+              <a:t>(1 – 0.01) * 10 000l * 0.0675 €/500ml = 668.25€  =&gt; 60.75€ mehr Gewinn pro 5 000l</a:t>
             </a:r>
           </a:p>
           <a:p>
@@ -14228,8 +14223,8 @@
         </p:nvCxnSpPr>
         <p:spPr>
           <a:xfrm flipV="1">
-            <a:off x="4688189" y="2538248"/>
-            <a:ext cx="0" cy="591207"/>
+            <a:off x="4688189" y="3263464"/>
+            <a:ext cx="0" cy="536026"/>
           </a:xfrm>
           <a:prstGeom prst="straightConnector1">
             <a:avLst/>
@@ -14275,7 +14270,7 @@
         </p:nvCxnSpPr>
         <p:spPr>
           <a:xfrm flipH="1">
-            <a:off x="367932" y="2538248"/>
+            <a:off x="367932" y="3263462"/>
             <a:ext cx="4320257" cy="1"/>
           </a:xfrm>
           <a:prstGeom prst="straightConnector1">

</xml_diff>

<commit_message>
added notice what to improve
</commit_message>
<xml_diff>
--- a/Präsentation/Präsentation.pptx
+++ b/Präsentation/Präsentation.pptx
@@ -4727,7 +4727,10 @@
           <a:bodyPr/>
           <a:lstStyle/>
           <a:p>
-            <a:endParaRPr lang="de-DE" dirty="0"/>
+            <a:r>
+              <a:rPr lang="de-DE" dirty="0"/>
+              <a:t>- RFID ist noch optional</a:t>
+            </a:r>
           </a:p>
         </p:txBody>
       </p:sp>
@@ -4748,7 +4751,7 @@
           <a:p>
             <a:fld id="{2F526E87-3F77-4BDE-BD80-0F6E2B67AF76}" type="slidenum">
               <a:rPr lang="de-DE" smtClean="0"/>
-              <a:t>10</a:t>
+              <a:t>6</a:t>
             </a:fld>
             <a:endParaRPr lang="de-DE"/>
           </a:p>
@@ -4757,7 +4760,7 @@
     </p:spTree>
     <p:extLst>
       <p:ext uri="{BB962C8B-B14F-4D97-AF65-F5344CB8AC3E}">
-        <p14:creationId xmlns:p14="http://schemas.microsoft.com/office/powerpoint/2010/main" val="2559009092"/>
+        <p14:creationId xmlns:p14="http://schemas.microsoft.com/office/powerpoint/2010/main" val="410983260"/>
       </p:ext>
     </p:extLst>
   </p:cSld>
@@ -4811,16 +4814,7 @@
           <a:bodyPr/>
           <a:lstStyle/>
           <a:p>
-            <a:r>
-              <a:rPr lang="de-DE" dirty="0"/>
-              <a:t>Annahme:</a:t>
-            </a:r>
-          </a:p>
-          <a:p>
-            <a:r>
-              <a:rPr lang="de-DE" dirty="0"/>
-              <a:t>-   40 Mitarbeiter zeitgleich in der Produktion arbeiten -&gt; 40 Tablets + 40 SAP User</a:t>
-            </a:r>
+            <a:endParaRPr lang="de-DE" dirty="0"/>
           </a:p>
         </p:txBody>
       </p:sp>
@@ -4841,7 +4835,7 @@
           <a:p>
             <a:fld id="{2F526E87-3F77-4BDE-BD80-0F6E2B67AF76}" type="slidenum">
               <a:rPr lang="de-DE" smtClean="0"/>
-              <a:t>11</a:t>
+              <a:t>10</a:t>
             </a:fld>
             <a:endParaRPr lang="de-DE"/>
           </a:p>
@@ -4850,7 +4844,7 @@
     </p:spTree>
     <p:extLst>
       <p:ext uri="{BB962C8B-B14F-4D97-AF65-F5344CB8AC3E}">
-        <p14:creationId xmlns:p14="http://schemas.microsoft.com/office/powerpoint/2010/main" val="2987293007"/>
+        <p14:creationId xmlns:p14="http://schemas.microsoft.com/office/powerpoint/2010/main" val="2559009092"/>
       </p:ext>
     </p:extLst>
   </p:cSld>
@@ -4906,6 +4900,118 @@
           <a:p>
             <a:r>
               <a:rPr lang="de-DE" dirty="0"/>
+              <a:t>Annahme:</a:t>
+            </a:r>
+          </a:p>
+          <a:p>
+            <a:pPr marL="171450" indent="-171450">
+              <a:buFontTx/>
+              <a:buChar char="-"/>
+            </a:pPr>
+            <a:r>
+              <a:rPr lang="de-DE" dirty="0"/>
+              <a:t>40 Mitarbeiter zeitgleich in der Produktion arbeiten -&gt; 40 Tablets + 40 SAP User</a:t>
+            </a:r>
+          </a:p>
+          <a:p>
+            <a:pPr marL="171450" indent="-171450">
+              <a:buFontTx/>
+              <a:buChar char="-"/>
+            </a:pPr>
+            <a:r>
+              <a:rPr lang="de-DE" dirty="0"/>
+              <a:t>Ein Tablet (</a:t>
+            </a:r>
+            <a:r>
+              <a:rPr lang="de-DE"/>
+              <a:t>mobiles Anzeigegerät) kostet 80€</a:t>
+            </a:r>
+            <a:endParaRPr lang="de-DE" dirty="0"/>
+          </a:p>
+        </p:txBody>
+      </p:sp>
+      <p:sp>
+        <p:nvSpPr>
+          <p:cNvPr id="4" name="Foliennummernplatzhalter 3"/>
+          <p:cNvSpPr>
+            <a:spLocks noGrp="1"/>
+          </p:cNvSpPr>
+          <p:nvPr>
+            <p:ph type="sldNum" sz="quarter" idx="5"/>
+          </p:nvPr>
+        </p:nvSpPr>
+        <p:spPr/>
+        <p:txBody>
+          <a:bodyPr/>
+          <a:lstStyle/>
+          <a:p>
+            <a:fld id="{2F526E87-3F77-4BDE-BD80-0F6E2B67AF76}" type="slidenum">
+              <a:rPr lang="de-DE" smtClean="0"/>
+              <a:t>11</a:t>
+            </a:fld>
+            <a:endParaRPr lang="de-DE"/>
+          </a:p>
+        </p:txBody>
+      </p:sp>
+    </p:spTree>
+    <p:extLst>
+      <p:ext uri="{BB962C8B-B14F-4D97-AF65-F5344CB8AC3E}">
+        <p14:creationId xmlns:p14="http://schemas.microsoft.com/office/powerpoint/2010/main" val="2987293007"/>
+      </p:ext>
+    </p:extLst>
+  </p:cSld>
+  <p:clrMapOvr>
+    <a:masterClrMapping/>
+  </p:clrMapOvr>
+</p:notes>
+</file>
+
+<file path=ppt/notesSlides/notesSlide4.xml><?xml version="1.0" encoding="utf-8"?>
+<p:notes xmlns:a="http://schemas.openxmlformats.org/drawingml/2006/main" xmlns:r="http://schemas.openxmlformats.org/officeDocument/2006/relationships" xmlns:p="http://schemas.openxmlformats.org/presentationml/2006/main">
+  <p:cSld>
+    <p:spTree>
+      <p:nvGrpSpPr>
+        <p:cNvPr id="1" name=""/>
+        <p:cNvGrpSpPr/>
+        <p:nvPr/>
+      </p:nvGrpSpPr>
+      <p:grpSpPr>
+        <a:xfrm>
+          <a:off x="0" y="0"/>
+          <a:ext cx="0" cy="0"/>
+          <a:chOff x="0" y="0"/>
+          <a:chExt cx="0" cy="0"/>
+        </a:xfrm>
+      </p:grpSpPr>
+      <p:sp>
+        <p:nvSpPr>
+          <p:cNvPr id="2" name="Folienbildplatzhalter 1"/>
+          <p:cNvSpPr>
+            <a:spLocks noGrp="1" noRot="1" noChangeAspect="1"/>
+          </p:cNvSpPr>
+          <p:nvPr>
+            <p:ph type="sldImg"/>
+          </p:nvPr>
+        </p:nvSpPr>
+        <p:spPr/>
+      </p:sp>
+      <p:sp>
+        <p:nvSpPr>
+          <p:cNvPr id="3" name="Notizenplatzhalter 2"/>
+          <p:cNvSpPr>
+            <a:spLocks noGrp="1"/>
+          </p:cNvSpPr>
+          <p:nvPr>
+            <p:ph type="body" idx="1"/>
+          </p:nvPr>
+        </p:nvSpPr>
+        <p:spPr/>
+        <p:txBody>
+          <a:bodyPr/>
+          <a:lstStyle/>
+          <a:p>
+            <a:r>
+              <a:rPr lang="de-DE" dirty="0"/>
               <a:t>Annahme </a:t>
             </a:r>
           </a:p>
@@ -4951,6 +5057,17 @@
               <a:rPr lang="de-DE" dirty="0"/>
               <a:t>Produktionskosten von 0.675€/500ml</a:t>
             </a:r>
+          </a:p>
+          <a:p>
+            <a:pPr marL="171450" indent="-171450">
+              <a:buFontTx/>
+              <a:buChar char="-"/>
+            </a:pPr>
+            <a:r>
+              <a:rPr lang="de-DE"/>
+              <a:t>Von 11% auf 15,3%</a:t>
+            </a:r>
+            <a:endParaRPr lang="de-DE" dirty="0"/>
           </a:p>
         </p:txBody>
       </p:sp>
@@ -10784,7 +10901,12 @@
             <p:ph idx="1"/>
           </p:nvPr>
         </p:nvSpPr>
-        <p:spPr/>
+        <p:spPr>
+          <a:xfrm>
+            <a:off x="1097280" y="1845734"/>
+            <a:ext cx="10058400" cy="4023360"/>
+          </a:xfrm>
+        </p:spPr>
         <p:txBody>
           <a:bodyPr>
             <a:normAutofit fontScale="85000" lnSpcReduction="20000"/>
@@ -13637,7 +13759,7 @@
           <p:nvPr/>
         </p:nvPicPr>
         <p:blipFill>
-          <a:blip r:embed="rId2">
+          <a:blip r:embed="rId3">
             <a:extLst>
               <a:ext uri="{28A0092B-C50C-407E-A947-70E740481C1C}">
                 <a14:useLocalDpi xmlns:a14="http://schemas.microsoft.com/office/drawing/2010/main" val="0"/>

</xml_diff>